<commit_message>
Meet the requirements of the exam.
</commit_message>
<xml_diff>
--- a/PowerPoint_Photos_Helper/bin/Debug/Sample.pptx
+++ b/PowerPoint_Photos_Helper/bin/Debug/Sample.pptx
@@ -3255,7 +3255,7 @@
             <a:pPr defTabSz="914400"/>
             <a:r>
               <a:rPr/>
-              <a:t>cats</a:t>
+              <a:t>Enter Slide Title</a:t>
             </a:r>
           </a:p>
         </p:txBody>
@@ -3290,14 +3290,46 @@
             <a:pPr defTabSz="914400"/>
             <a:r>
               <a:rPr/>
-              <a:t>Enter Slide Text</a:t>
-            </a:r>
-          </a:p>
-        </p:txBody>
-      </p:sp>
-      <p:sp>
-        <p:nvSpPr>
-          <p:cNvPr id="4" name="SyncfusionLicense"/>
+              <a:t>Press ctrl+B to toggle Bold
+</a:t>
+            </a:r>
+          </a:p>
+        </p:txBody>
+      </p:sp>
+      <p:pic>
+        <p:nvPicPr>
+          <p:cNvPr id="4" name="Picture 4"/>
+          <p:cNvPicPr>
+            <a:picLocks noChangeAspect="1"/>
+          </p:cNvPicPr>
+          <p:nvPr/>
+        </p:nvPicPr>
+        <p:blipFill>
+          <a:blip r:embed="rId2">
+            <a:lum/>
+          </a:blip>
+          <a:srcRect/>
+          <a:stretch>
+            <a:fillRect/>
+          </a:stretch>
+        </p:blipFill>
+        <p:spPr bwMode="white">
+          <a:xfrm rot="0">
+            <a:off x="6347333" y="3030093"/>
+            <a:ext cx="4629658" cy="2440432"/>
+          </a:xfrm>
+          <a:prstGeom prst="rect">
+            <a:avLst/>
+          </a:prstGeom>
+          <a:ln>
+            <a:headEnd type="none"/>
+            <a:tailEnd type="none"/>
+          </a:ln>
+        </p:spPr>
+      </p:pic>
+      <p:sp>
+        <p:nvSpPr>
+          <p:cNvPr id="5" name="SyncfusionLicense"/>
           <p:cNvSpPr txBox="1">
             <a:spLocks noChangeArrowheads="1"/>
           </p:cNvSpPr>

</xml_diff>